<commit_message>
Add Lesson 3 new one
</commit_message>
<xml_diff>
--- a/Tutorial/Lesson2/Micro python With ESP8266 -2.pptx
+++ b/Tutorial/Lesson2/Micro python With ESP8266 -2.pptx
@@ -5,20 +5,18 @@
     <p:sldMasterId id="2147483648" r:id="rId4"/>
   </p:sldMasterIdLst>
   <p:notesMasterIdLst>
-    <p:notesMasterId r:id="rId13"/>
+    <p:notesMasterId r:id="rId11"/>
   </p:notesMasterIdLst>
   <p:handoutMasterIdLst>
-    <p:handoutMasterId r:id="rId14"/>
+    <p:handoutMasterId r:id="rId12"/>
   </p:handoutMasterIdLst>
   <p:sldIdLst>
-    <p:sldId id="256" r:id="rId5"/>
-    <p:sldId id="305" r:id="rId6"/>
-    <p:sldId id="297" r:id="rId7"/>
-    <p:sldId id="298" r:id="rId8"/>
+    <p:sldId id="307" r:id="rId5"/>
+    <p:sldId id="297" r:id="rId6"/>
+    <p:sldId id="298" r:id="rId7"/>
+    <p:sldId id="306" r:id="rId8"/>
     <p:sldId id="300" r:id="rId9"/>
-    <p:sldId id="282" r:id="rId10"/>
-    <p:sldId id="301" r:id="rId11"/>
-    <p:sldId id="271" r:id="rId12"/>
+    <p:sldId id="271" r:id="rId10"/>
   </p:sldIdLst>
   <p:sldSz cx="12192000" cy="6858000"/>
   <p:notesSz cx="6858000" cy="9144000"/>
@@ -222,7 +220,7 @@
           <a:p>
             <a:fld id="{B56F32FC-4BD9-442A-A8C6-51598C909FE3}" type="datetimeFigureOut">
               <a:rPr lang="en-US" smtClean="0"/>
-              <a:t>9/7/2024</a:t>
+              <a:t>9/10/2024</a:t>
             </a:fld>
             <a:endParaRPr lang="en-US" dirty="0"/>
           </a:p>
@@ -315,6 +313,33 @@
   </p:cSld>
   <p:clrMap bg1="lt1" tx1="dk1" bg2="lt2" tx2="dk2" accent1="accent1" accent2="accent2" accent3="accent3" accent4="accent4" accent5="accent5" accent6="accent6" hlink="hlink" folHlink="folHlink"/>
 </p:handoutMaster>
+</file>
+
+<file path=ppt/ink/ink1.xml><?xml version="1.0" encoding="utf-8"?>
+<inkml:ink xmlns:inkml="http://www.w3.org/2003/InkML">
+  <inkml:definitions>
+    <inkml:context xml:id="ctx0">
+      <inkml:inkSource xml:id="inkSrc0">
+        <inkml:traceFormat>
+          <inkml:channel name="X" type="integer" min="-2.14748E9" max="2.14748E9" units="cm"/>
+          <inkml:channel name="Y" type="integer" min="-2.14748E9" max="2.14748E9" units="cm"/>
+          <inkml:channel name="F" type="integer" max="32767" units="dev"/>
+        </inkml:traceFormat>
+        <inkml:channelProperties>
+          <inkml:channelProperty channel="X" name="resolution" value="1000" units="1/cm"/>
+          <inkml:channelProperty channel="Y" name="resolution" value="1000" units="1/cm"/>
+          <inkml:channelProperty channel="F" name="resolution" value="0" units="1/dev"/>
+        </inkml:channelProperties>
+      </inkml:inkSource>
+      <inkml:timestamp xml:id="ts0" timeString="2024-09-09T20:34:08.769"/>
+    </inkml:context>
+    <inkml:brush xml:id="br0">
+      <inkml:brushProperty name="width" value="0.2" units="cm"/>
+      <inkml:brushProperty name="height" value="0.2" units="cm"/>
+    </inkml:brush>
+  </inkml:definitions>
+  <inkml:trace contextRef="#ctx0" brushRef="#br0">0 1 24575,'0'10'0,"0"14"0,0 14 0,11-1 0,3 4 0,-1 6 0,-2 5 0,-4 4 0,-2 2 0,-2 2 0,-3-9-8191</inkml:trace>
+</inkml:ink>
 </file>
 
 <file path=ppt/notesMasters/notesMaster1.xml><?xml version="1.0" encoding="utf-8"?>
@@ -399,7 +424,7 @@
           <a:p>
             <a:fld id="{056371FA-A98D-41E8-93F4-09945841298A}" type="datetimeFigureOut">
               <a:rPr lang="en-US" smtClean="0"/>
-              <a:t>9/7/2024</a:t>
+              <a:t>9/10/2024</a:t>
             </a:fld>
             <a:endParaRPr lang="en-US" dirty="0"/>
           </a:p>
@@ -815,7 +840,7 @@
           <a:p>
             <a:fld id="{22289C57-55D7-40A4-A101-E74FAC7A092B}" type="slidenum">
               <a:rPr lang="en-US" smtClean="0"/>
-              <a:t>3</a:t>
+              <a:t>2</a:t>
             </a:fld>
             <a:endParaRPr lang="en-US" dirty="0"/>
           </a:p>
@@ -878,7 +903,10 @@
           <a:bodyPr/>
           <a:lstStyle/>
           <a:p>
-            <a:endParaRPr lang="en-US" dirty="0"/>
+            <a:r>
+              <a:rPr lang="en-US" dirty="0"/>
+              <a:t>https://docs.micropython.org/en/latest/esp8266/tutorial/intro.html#intro</a:t>
+            </a:r>
           </a:p>
         </p:txBody>
       </p:sp>
@@ -899,7 +927,7 @@
           <a:p>
             <a:fld id="{22289C57-55D7-40A4-A101-E74FAC7A092B}" type="slidenum">
               <a:rPr lang="en-US" smtClean="0"/>
-              <a:t>6</a:t>
+              <a:t>4</a:t>
             </a:fld>
             <a:endParaRPr lang="en-US" dirty="0"/>
           </a:p>
@@ -908,7 +936,7 @@
     </p:spTree>
     <p:extLst>
       <p:ext uri="{BB962C8B-B14F-4D97-AF65-F5344CB8AC3E}">
-        <p14:creationId xmlns:p14="http://schemas.microsoft.com/office/powerpoint/2010/main" val="236659336"/>
+        <p14:creationId xmlns:p14="http://schemas.microsoft.com/office/powerpoint/2010/main" val="2057887948"/>
       </p:ext>
     </p:extLst>
   </p:cSld>
@@ -962,7 +990,43 @@
           <a:bodyPr/>
           <a:lstStyle/>
           <a:p>
+            <a:r>
+              <a:rPr lang="en-US" dirty="0"/>
+              <a:t>ESP8266 CH340 Driver : </a:t>
+            </a:r>
+          </a:p>
+          <a:p>
+            <a:r>
+              <a:rPr lang="en-US" dirty="0"/>
+              <a:t>https://cdn.sparkfun.com/assets/learn_tutorials/8/4/4/CH341SER.EXE </a:t>
+            </a:r>
+          </a:p>
+          <a:p>
+            <a:r>
+              <a:rPr lang="en-US" dirty="0"/>
+              <a:t>Cp210x Driver : </a:t>
+            </a:r>
+          </a:p>
+          <a:p>
+            <a:r>
+              <a:rPr lang="en-US" dirty="0"/>
+              <a:t>https://www.silabs.com/developers/usb-to-uart-bridge-vcp-drivers</a:t>
+            </a:r>
+          </a:p>
+          <a:p>
+            <a:r>
+              <a:rPr lang="en-US" dirty="0"/>
+              <a:t>ESP8266 Firmware : </a:t>
+            </a:r>
+          </a:p>
+          <a:p>
             <a:endParaRPr lang="en-US" dirty="0"/>
+          </a:p>
+          <a:p>
+            <a:r>
+              <a:rPr lang="en-US" dirty="0"/>
+              <a:t>https://micropython.org/download/#esp8266</a:t>
+            </a:r>
           </a:p>
         </p:txBody>
       </p:sp>
@@ -983,7 +1047,91 @@
           <a:p>
             <a:fld id="{22289C57-55D7-40A4-A101-E74FAC7A092B}" type="slidenum">
               <a:rPr lang="en-US" smtClean="0"/>
-              <a:t>8</a:t>
+              <a:t>5</a:t>
+            </a:fld>
+            <a:endParaRPr lang="en-US" dirty="0"/>
+          </a:p>
+        </p:txBody>
+      </p:sp>
+    </p:spTree>
+    <p:extLst>
+      <p:ext uri="{BB962C8B-B14F-4D97-AF65-F5344CB8AC3E}">
+        <p14:creationId xmlns:p14="http://schemas.microsoft.com/office/powerpoint/2010/main" val="2552076937"/>
+      </p:ext>
+    </p:extLst>
+  </p:cSld>
+  <p:clrMapOvr>
+    <a:masterClrMapping/>
+  </p:clrMapOvr>
+</p:notes>
+</file>
+
+<file path=ppt/notesSlides/notesSlide5.xml><?xml version="1.0" encoding="utf-8"?>
+<p:notes xmlns:a="http://schemas.openxmlformats.org/drawingml/2006/main" xmlns:r="http://schemas.openxmlformats.org/officeDocument/2006/relationships" xmlns:p="http://schemas.openxmlformats.org/presentationml/2006/main">
+  <p:cSld>
+    <p:spTree>
+      <p:nvGrpSpPr>
+        <p:cNvPr id="1" name=""/>
+        <p:cNvGrpSpPr/>
+        <p:nvPr/>
+      </p:nvGrpSpPr>
+      <p:grpSpPr>
+        <a:xfrm>
+          <a:off x="0" y="0"/>
+          <a:ext cx="0" cy="0"/>
+          <a:chOff x="0" y="0"/>
+          <a:chExt cx="0" cy="0"/>
+        </a:xfrm>
+      </p:grpSpPr>
+      <p:sp>
+        <p:nvSpPr>
+          <p:cNvPr id="2" name="Slide Image Placeholder 1"/>
+          <p:cNvSpPr>
+            <a:spLocks noGrp="1" noRot="1" noChangeAspect="1"/>
+          </p:cNvSpPr>
+          <p:nvPr>
+            <p:ph type="sldImg"/>
+          </p:nvPr>
+        </p:nvSpPr>
+        <p:spPr/>
+      </p:sp>
+      <p:sp>
+        <p:nvSpPr>
+          <p:cNvPr id="3" name="Notes Placeholder 2"/>
+          <p:cNvSpPr>
+            <a:spLocks noGrp="1"/>
+          </p:cNvSpPr>
+          <p:nvPr>
+            <p:ph type="body" idx="1"/>
+          </p:nvPr>
+        </p:nvSpPr>
+        <p:spPr/>
+        <p:txBody>
+          <a:bodyPr/>
+          <a:lstStyle/>
+          <a:p>
+            <a:endParaRPr lang="en-US" dirty="0"/>
+          </a:p>
+        </p:txBody>
+      </p:sp>
+      <p:sp>
+        <p:nvSpPr>
+          <p:cNvPr id="4" name="Slide Number Placeholder 3"/>
+          <p:cNvSpPr>
+            <a:spLocks noGrp="1"/>
+          </p:cNvSpPr>
+          <p:nvPr>
+            <p:ph type="sldNum" sz="quarter" idx="5"/>
+          </p:nvPr>
+        </p:nvSpPr>
+        <p:spPr/>
+        <p:txBody>
+          <a:bodyPr/>
+          <a:lstStyle/>
+          <a:p>
+            <a:fld id="{22289C57-55D7-40A4-A101-E74FAC7A092B}" type="slidenum">
+              <a:rPr lang="en-US" smtClean="0"/>
+              <a:t>6</a:t>
             </a:fld>
             <a:endParaRPr lang="en-US" dirty="0"/>
           </a:p>
@@ -6381,7 +6529,7 @@
         </p:nvSpPr>
         <p:spPr>
           <a:xfrm>
-            <a:off x="5476874" y="1671639"/>
+            <a:off x="3920190" y="1044000"/>
             <a:ext cx="5884027" cy="1204912"/>
           </a:xfrm>
         </p:spPr>
@@ -6663,7 +6811,7 @@
         </p:blipFill>
         <p:spPr bwMode="auto">
           <a:xfrm>
-            <a:off x="5453725" y="3660774"/>
+            <a:off x="5453725" y="4288083"/>
             <a:ext cx="5907176" cy="2536826"/>
           </a:xfrm>
           <a:prstGeom prst="rect">
@@ -6681,10 +6829,96 @@
           </a:extLst>
         </p:spPr>
       </p:pic>
+      <p:sp>
+        <p:nvSpPr>
+          <p:cNvPr id="5" name="TextBox 4">
+            <a:extLst>
+              <a:ext uri="{FF2B5EF4-FFF2-40B4-BE49-F238E27FC236}">
+                <a16:creationId xmlns:a16="http://schemas.microsoft.com/office/drawing/2014/main" id="{A33D67C4-D89B-6DA6-ECBA-72841251AC98}"/>
+              </a:ext>
+            </a:extLst>
+          </p:cNvPr>
+          <p:cNvSpPr txBox="1"/>
+          <p:nvPr/>
+        </p:nvSpPr>
+        <p:spPr>
+          <a:xfrm>
+            <a:off x="5825248" y="3212305"/>
+            <a:ext cx="6109138" cy="523220"/>
+          </a:xfrm>
+          <a:prstGeom prst="rect">
+            <a:avLst/>
+          </a:prstGeom>
+          <a:noFill/>
+        </p:spPr>
+        <p:txBody>
+          <a:bodyPr wrap="square">
+            <a:spAutoFit/>
+          </a:bodyPr>
+          <a:lstStyle/>
+          <a:p>
+            <a:r>
+              <a:rPr lang="en-US" sz="2800" cap="all" spc="150" dirty="0">
+                <a:latin typeface="+mj-lt"/>
+                <a:ea typeface="+mj-ea"/>
+                <a:cs typeface="+mj-cs"/>
+              </a:rPr>
+              <a:t>for the Internet of Things</a:t>
+            </a:r>
+          </a:p>
+        </p:txBody>
+      </p:sp>
+      <p:pic>
+        <p:nvPicPr>
+          <p:cNvPr id="4" name="Picture 4">
+            <a:extLst>
+              <a:ext uri="{FF2B5EF4-FFF2-40B4-BE49-F238E27FC236}">
+                <a16:creationId xmlns:a16="http://schemas.microsoft.com/office/drawing/2014/main" id="{D38378E0-7F06-D1C3-051F-868F48316EE4}"/>
+              </a:ext>
+            </a:extLst>
+          </p:cNvPr>
+          <p:cNvPicPr>
+            <a:picLocks noChangeAspect="1" noChangeArrowheads="1"/>
+          </p:cNvPicPr>
+          <p:nvPr/>
+        </p:nvPicPr>
+        <p:blipFill>
+          <a:blip r:embed="rId5">
+            <a:extLst>
+              <a:ext uri="{28A0092B-C50C-407E-A947-70E740481C1C}">
+                <a14:useLocalDpi xmlns:a14="http://schemas.microsoft.com/office/drawing/2010/main" val="0"/>
+              </a:ext>
+            </a:extLst>
+          </a:blip>
+          <a:srcRect/>
+          <a:stretch>
+            <a:fillRect/>
+          </a:stretch>
+        </p:blipFill>
+        <p:spPr bwMode="auto">
+          <a:xfrm>
+            <a:off x="9165662" y="33091"/>
+            <a:ext cx="2541998" cy="2541998"/>
+          </a:xfrm>
+          <a:prstGeom prst="rect">
+            <a:avLst/>
+          </a:prstGeom>
+          <a:noFill/>
+          <a:extLst>
+            <a:ext uri="{909E8E84-426E-40DD-AFC4-6F175D3DCCD1}">
+              <a14:hiddenFill xmlns:a14="http://schemas.microsoft.com/office/drawing/2010/main">
+                <a:solidFill>
+                  <a:srgbClr val="FFFFFF"/>
+                </a:solidFill>
+              </a14:hiddenFill>
+            </a:ext>
+          </a:extLst>
+        </p:spPr>
+      </p:pic>
     </p:spTree>
     <p:extLst>
       <p:ext uri="{BB962C8B-B14F-4D97-AF65-F5344CB8AC3E}">
-        <p14:creationId xmlns:p14="http://schemas.microsoft.com/office/powerpoint/2010/main" val="2586058810"/>
+        <p14:creationId xmlns:p14="http://schemas.microsoft.com/office/powerpoint/2010/main" val="3888335515"/>
       </p:ext>
     </p:extLst>
   </p:cSld>
@@ -6713,10 +6947,10 @@
       </p:grpSpPr>
       <p:sp>
         <p:nvSpPr>
-          <p:cNvPr id="2" name="Title 1">
-            <a:extLst>
-              <a:ext uri="{FF2B5EF4-FFF2-40B4-BE49-F238E27FC236}">
-                <a16:creationId xmlns:a16="http://schemas.microsoft.com/office/drawing/2014/main" id="{9CE3F4A2-E27B-7DD8-9932-5B0AB766F7EB}"/>
+          <p:cNvPr id="5" name="Slide Number Placeholder 5">
+            <a:extLst>
+              <a:ext uri="{FF2B5EF4-FFF2-40B4-BE49-F238E27FC236}">
+                <a16:creationId xmlns:a16="http://schemas.microsoft.com/office/drawing/2014/main" id="{4832B776-E386-1CF9-CC8F-2D2FF3EA7066}"/>
               </a:ext>
             </a:extLst>
           </p:cNvPr>
@@ -6724,82 +6958,15 @@
             <a:spLocks noGrp="1"/>
           </p:cNvSpPr>
           <p:nvPr>
-            <p:ph type="title"/>
+            <p:ph type="sldNum" sz="quarter" idx="12"/>
           </p:nvPr>
         </p:nvSpPr>
         <p:spPr>
           <a:xfrm>
-            <a:off x="1213830" y="260674"/>
-            <a:ext cx="7288282" cy="839706"/>
-          </a:xfrm>
-        </p:spPr>
-        <p:txBody>
-          <a:bodyPr/>
-          <a:lstStyle/>
-          <a:p>
-            <a:r>
-              <a:rPr lang="en-US" dirty="0" err="1"/>
-              <a:t>Thonny</a:t>
-            </a:r>
-            <a:r>
-              <a:rPr lang="en-US" dirty="0"/>
-              <a:t> IDE </a:t>
-            </a:r>
-          </a:p>
-        </p:txBody>
-      </p:sp>
-      <p:sp>
-        <p:nvSpPr>
-          <p:cNvPr id="3" name="Content Placeholder 2">
-            <a:extLst>
-              <a:ext uri="{FF2B5EF4-FFF2-40B4-BE49-F238E27FC236}">
-                <a16:creationId xmlns:a16="http://schemas.microsoft.com/office/drawing/2014/main" id="{BD1BB0BA-E57E-B326-1C0F-BE162A25C798}"/>
-              </a:ext>
-            </a:extLst>
-          </p:cNvPr>
-          <p:cNvSpPr>
-            <a:spLocks noGrp="1"/>
-          </p:cNvSpPr>
-          <p:nvPr>
-            <p:ph sz="half" idx="2"/>
-          </p:nvPr>
-        </p:nvSpPr>
-        <p:spPr>
-          <a:xfrm>
-            <a:off x="826372" y="5827363"/>
-            <a:ext cx="7288212" cy="342766"/>
-          </a:xfrm>
-        </p:spPr>
-        <p:txBody>
-          <a:bodyPr>
-            <a:normAutofit lnSpcReduction="10000"/>
-          </a:bodyPr>
-          <a:lstStyle/>
-          <a:p>
-            <a:r>
-              <a:rPr lang="en-US" dirty="0"/>
-              <a:t>https://thonny.org/</a:t>
-            </a:r>
-          </a:p>
-        </p:txBody>
-      </p:sp>
-      <p:sp>
-        <p:nvSpPr>
-          <p:cNvPr id="4" name="Slide Number Placeholder 3">
-            <a:extLst>
-              <a:ext uri="{FF2B5EF4-FFF2-40B4-BE49-F238E27FC236}">
-                <a16:creationId xmlns:a16="http://schemas.microsoft.com/office/drawing/2014/main" id="{36FC33F4-F497-A651-E8E8-DFDC67168A4F}"/>
-              </a:ext>
-            </a:extLst>
-          </p:cNvPr>
-          <p:cNvSpPr>
-            <a:spLocks noGrp="1"/>
-          </p:cNvSpPr>
-          <p:nvPr>
-            <p:ph type="sldNum" sz="quarter" idx="12"/>
-          </p:nvPr>
-        </p:nvSpPr>
-        <p:spPr/>
+            <a:off x="10373350" y="6356349"/>
+            <a:ext cx="987552" cy="365125"/>
+          </a:xfrm>
+        </p:spPr>
         <p:txBody>
           <a:bodyPr/>
           <a:lstStyle/>
@@ -6815,37 +6982,241 @@
       </p:sp>
       <p:pic>
         <p:nvPicPr>
-          <p:cNvPr id="6" name="Picture 5">
-            <a:extLst>
-              <a:ext uri="{FF2B5EF4-FFF2-40B4-BE49-F238E27FC236}">
-                <a16:creationId xmlns:a16="http://schemas.microsoft.com/office/drawing/2014/main" id="{89289377-6FB8-D48D-8E1D-731AADA486F1}"/>
+          <p:cNvPr id="4098" name="Picture 2">
+            <a:extLst>
+              <a:ext uri="{FF2B5EF4-FFF2-40B4-BE49-F238E27FC236}">
+                <a16:creationId xmlns:a16="http://schemas.microsoft.com/office/drawing/2014/main" id="{9311F45A-4FEF-1C87-D087-E5E7B88DCCC1}"/>
               </a:ext>
             </a:extLst>
           </p:cNvPr>
           <p:cNvPicPr>
-            <a:picLocks noChangeAspect="1"/>
+            <a:picLocks noChangeAspect="1" noChangeArrowheads="1"/>
           </p:cNvPicPr>
           <p:nvPr/>
         </p:nvPicPr>
         <p:blipFill rotWithShape="1">
-          <a:blip r:embed="rId2"/>
-          <a:srcRect l="25805" t="16028" r="27161" b="7293"/>
+          <a:blip r:embed="rId3">
+            <a:extLst>
+              <a:ext uri="{28A0092B-C50C-407E-A947-70E740481C1C}">
+                <a14:useLocalDpi xmlns:a14="http://schemas.microsoft.com/office/drawing/2010/main" val="0"/>
+              </a:ext>
+            </a:extLst>
+          </a:blip>
+          <a:srcRect l="24348" t="3285" r="25032" b="90290"/>
           <a:stretch/>
         </p:blipFill>
-        <p:spPr>
-          <a:xfrm>
-            <a:off x="3011837" y="1204282"/>
-            <a:ext cx="6168326" cy="5653718"/>
+        <p:spPr bwMode="auto">
+          <a:xfrm>
+            <a:off x="0" y="1304925"/>
+            <a:ext cx="4526905" cy="352480"/>
           </a:xfrm>
           <a:prstGeom prst="rect">
             <a:avLst/>
           </a:prstGeom>
+          <a:noFill/>
+          <a:extLst>
+            <a:ext uri="{909E8E84-426E-40DD-AFC4-6F175D3DCCD1}">
+              <a14:hiddenFill xmlns:a14="http://schemas.microsoft.com/office/drawing/2010/main">
+                <a:solidFill>
+                  <a:srgbClr val="FFFFFF"/>
+                </a:solidFill>
+              </a14:hiddenFill>
+            </a:ext>
+          </a:extLst>
         </p:spPr>
       </p:pic>
+      <p:pic>
+        <p:nvPicPr>
+          <p:cNvPr id="7" name="Picture 2">
+            <a:extLst>
+              <a:ext uri="{FF2B5EF4-FFF2-40B4-BE49-F238E27FC236}">
+                <a16:creationId xmlns:a16="http://schemas.microsoft.com/office/drawing/2014/main" id="{4A625E15-D4E3-5447-0FED-43278B987AC9}"/>
+              </a:ext>
+            </a:extLst>
+          </p:cNvPr>
+          <p:cNvPicPr>
+            <a:picLocks noChangeAspect="1" noChangeArrowheads="1"/>
+          </p:cNvPicPr>
+          <p:nvPr/>
+        </p:nvPicPr>
+        <p:blipFill rotWithShape="1">
+          <a:blip r:embed="rId3">
+            <a:extLst>
+              <a:ext uri="{28A0092B-C50C-407E-A947-70E740481C1C}">
+                <a14:useLocalDpi xmlns:a14="http://schemas.microsoft.com/office/drawing/2010/main" val="0"/>
+              </a:ext>
+            </a:extLst>
+          </a:blip>
+          <a:srcRect l="68659" t="9781" r="2171" b="4558"/>
+          <a:stretch/>
+        </p:blipFill>
+        <p:spPr bwMode="auto">
+          <a:xfrm>
+            <a:off x="2263452" y="1657405"/>
+            <a:ext cx="2608699" cy="4698944"/>
+          </a:xfrm>
+          <a:prstGeom prst="rect">
+            <a:avLst/>
+          </a:prstGeom>
+          <a:noFill/>
+          <a:extLst>
+            <a:ext uri="{909E8E84-426E-40DD-AFC4-6F175D3DCCD1}">
+              <a14:hiddenFill xmlns:a14="http://schemas.microsoft.com/office/drawing/2010/main">
+                <a:solidFill>
+                  <a:srgbClr val="FFFFFF"/>
+                </a:solidFill>
+              </a14:hiddenFill>
+            </a:ext>
+          </a:extLst>
+        </p:spPr>
+      </p:pic>
+      <p:pic>
+        <p:nvPicPr>
+          <p:cNvPr id="9" name="Picture 2">
+            <a:extLst>
+              <a:ext uri="{FF2B5EF4-FFF2-40B4-BE49-F238E27FC236}">
+                <a16:creationId xmlns:a16="http://schemas.microsoft.com/office/drawing/2014/main" id="{F6A76241-E4BA-E073-FF8D-5CD93EC28651}"/>
+              </a:ext>
+            </a:extLst>
+          </p:cNvPr>
+          <p:cNvPicPr>
+            <a:picLocks noChangeAspect="1" noChangeArrowheads="1"/>
+          </p:cNvPicPr>
+          <p:nvPr/>
+        </p:nvPicPr>
+        <p:blipFill rotWithShape="1">
+          <a:blip r:embed="rId3">
+            <a:extLst>
+              <a:ext uri="{28A0092B-C50C-407E-A947-70E740481C1C}">
+                <a14:useLocalDpi xmlns:a14="http://schemas.microsoft.com/office/drawing/2010/main" val="0"/>
+              </a:ext>
+            </a:extLst>
+          </a:blip>
+          <a:srcRect l="2285" t="9781" r="73453" b="4558"/>
+          <a:stretch/>
+        </p:blipFill>
+        <p:spPr bwMode="auto">
+          <a:xfrm>
+            <a:off x="0" y="1657405"/>
+            <a:ext cx="2169763" cy="4698944"/>
+          </a:xfrm>
+          <a:prstGeom prst="rect">
+            <a:avLst/>
+          </a:prstGeom>
+          <a:noFill/>
+          <a:extLst>
+            <a:ext uri="{909E8E84-426E-40DD-AFC4-6F175D3DCCD1}">
+              <a14:hiddenFill xmlns:a14="http://schemas.microsoft.com/office/drawing/2010/main">
+                <a:solidFill>
+                  <a:srgbClr val="FFFFFF"/>
+                </a:solidFill>
+              </a14:hiddenFill>
+            </a:ext>
+          </a:extLst>
+        </p:spPr>
+      </p:pic>
+      <p:pic>
+        <p:nvPicPr>
+          <p:cNvPr id="3078" name="Picture 6" descr="NodeMCU ESP8266 Pinout Listing To Matching Functions">
+            <a:extLst>
+              <a:ext uri="{FF2B5EF4-FFF2-40B4-BE49-F238E27FC236}">
+                <a16:creationId xmlns:a16="http://schemas.microsoft.com/office/drawing/2014/main" id="{5551313F-6098-9F29-8EB8-CC9ED80B0DED}"/>
+              </a:ext>
+            </a:extLst>
+          </p:cNvPr>
+          <p:cNvPicPr>
+            <a:picLocks noChangeAspect="1" noChangeArrowheads="1"/>
+          </p:cNvPicPr>
+          <p:nvPr/>
+        </p:nvPicPr>
+        <p:blipFill>
+          <a:blip r:embed="rId4">
+            <a:extLst>
+              <a:ext uri="{28A0092B-C50C-407E-A947-70E740481C1C}">
+                <a14:useLocalDpi xmlns:a14="http://schemas.microsoft.com/office/drawing/2010/main" val="0"/>
+              </a:ext>
+            </a:extLst>
+          </a:blip>
+          <a:srcRect/>
+          <a:stretch>
+            <a:fillRect/>
+          </a:stretch>
+        </p:blipFill>
+        <p:spPr bwMode="auto">
+          <a:xfrm>
+            <a:off x="4526905" y="291992"/>
+            <a:ext cx="7620000" cy="6246919"/>
+          </a:xfrm>
+          <a:prstGeom prst="rect">
+            <a:avLst/>
+          </a:prstGeom>
+          <a:noFill/>
+          <a:extLst>
+            <a:ext uri="{909E8E84-426E-40DD-AFC4-6F175D3DCCD1}">
+              <a14:hiddenFill xmlns:a14="http://schemas.microsoft.com/office/drawing/2010/main">
+                <a:solidFill>
+                  <a:srgbClr val="FFFFFF"/>
+                </a:solidFill>
+              </a14:hiddenFill>
+            </a:ext>
+          </a:extLst>
+        </p:spPr>
+      </p:pic>
+      <mc:AlternateContent xmlns:mc="http://schemas.openxmlformats.org/markup-compatibility/2006" xmlns:p14="http://schemas.microsoft.com/office/powerpoint/2010/main">
+        <mc:Choice Requires="p14">
+          <p:contentPart p14:bwMode="auto" r:id="rId5">
+            <p14:nvContentPartPr>
+              <p14:cNvPr id="2" name="Ink 1">
+                <a:extLst>
+                  <a:ext uri="{FF2B5EF4-FFF2-40B4-BE49-F238E27FC236}">
+                    <a16:creationId xmlns:a16="http://schemas.microsoft.com/office/drawing/2014/main" id="{4B629433-44F7-B51A-56FB-0F23D96463A5}"/>
+                  </a:ext>
+                </a:extLst>
+              </p14:cNvPr>
+              <p14:cNvContentPartPr/>
+              <p14:nvPr/>
+            </p14:nvContentPartPr>
+            <p14:xfrm>
+              <a:off x="8621194" y="2328960"/>
+              <a:ext cx="23400" cy="171360"/>
+            </p14:xfrm>
+          </p:contentPart>
+        </mc:Choice>
+        <mc:Fallback xmlns="">
+          <p:pic>
+            <p:nvPicPr>
+              <p:cNvPr id="2" name="Ink 1">
+                <a:extLst>
+                  <a:ext uri="{FF2B5EF4-FFF2-40B4-BE49-F238E27FC236}">
+                    <a16:creationId xmlns:a16="http://schemas.microsoft.com/office/drawing/2014/main" id="{4B629433-44F7-B51A-56FB-0F23D96463A5}"/>
+                  </a:ext>
+                </a:extLst>
+              </p:cNvPr>
+              <p:cNvPicPr/>
+              <p:nvPr/>
+            </p:nvPicPr>
+            <p:blipFill>
+              <a:blip r:embed="rId6"/>
+              <a:stretch>
+                <a:fillRect/>
+              </a:stretch>
+            </p:blipFill>
+            <p:spPr>
+              <a:xfrm>
+                <a:off x="8585194" y="2293320"/>
+                <a:ext cx="95040" cy="243000"/>
+              </a:xfrm>
+              <a:prstGeom prst="rect">
+                <a:avLst/>
+              </a:prstGeom>
+            </p:spPr>
+          </p:pic>
+        </mc:Fallback>
+      </mc:AlternateContent>
     </p:spTree>
     <p:extLst>
       <p:ext uri="{BB962C8B-B14F-4D97-AF65-F5344CB8AC3E}">
-        <p14:creationId xmlns:p14="http://schemas.microsoft.com/office/powerpoint/2010/main" val="2374831619"/>
+        <p14:creationId xmlns:p14="http://schemas.microsoft.com/office/powerpoint/2010/main" val="690536802"/>
       </p:ext>
     </p:extLst>
   </p:cSld>
@@ -6874,10 +7245,10 @@
       </p:grpSpPr>
       <p:sp>
         <p:nvSpPr>
-          <p:cNvPr id="5" name="Slide Number Placeholder 5">
-            <a:extLst>
-              <a:ext uri="{FF2B5EF4-FFF2-40B4-BE49-F238E27FC236}">
-                <a16:creationId xmlns:a16="http://schemas.microsoft.com/office/drawing/2014/main" id="{4832B776-E386-1CF9-CC8F-2D2FF3EA7066}"/>
+          <p:cNvPr id="4" name="Slide Number Placeholder 3">
+            <a:extLst>
+              <a:ext uri="{FF2B5EF4-FFF2-40B4-BE49-F238E27FC236}">
+                <a16:creationId xmlns:a16="http://schemas.microsoft.com/office/drawing/2014/main" id="{4304B203-F0ED-326D-632B-C3F1E4A476AF}"/>
               </a:ext>
             </a:extLst>
           </p:cNvPr>
@@ -6888,12 +7259,7 @@
             <p:ph type="sldNum" sz="quarter" idx="12"/>
           </p:nvPr>
         </p:nvSpPr>
-        <p:spPr>
-          <a:xfrm>
-            <a:off x="10373350" y="6356349"/>
-            <a:ext cx="987552" cy="365125"/>
-          </a:xfrm>
-        </p:spPr>
+        <p:spPr/>
         <p:txBody>
           <a:bodyPr/>
           <a:lstStyle/>
@@ -6909,190 +7275,37 @@
       </p:sp>
       <p:pic>
         <p:nvPicPr>
-          <p:cNvPr id="4098" name="Picture 2">
-            <a:extLst>
-              <a:ext uri="{FF2B5EF4-FFF2-40B4-BE49-F238E27FC236}">
-                <a16:creationId xmlns:a16="http://schemas.microsoft.com/office/drawing/2014/main" id="{9311F45A-4FEF-1C87-D087-E5E7B88DCCC1}"/>
+          <p:cNvPr id="6" name="Picture 5" descr="A screenshot of a computer program&#10;&#10;Description automatically generated">
+            <a:extLst>
+              <a:ext uri="{FF2B5EF4-FFF2-40B4-BE49-F238E27FC236}">
+                <a16:creationId xmlns:a16="http://schemas.microsoft.com/office/drawing/2014/main" id="{10A9AE73-EA40-50AE-B55B-69A4E765E340}"/>
               </a:ext>
             </a:extLst>
           </p:cNvPr>
           <p:cNvPicPr>
-            <a:picLocks noChangeAspect="1" noChangeArrowheads="1"/>
+            <a:picLocks noChangeAspect="1"/>
           </p:cNvPicPr>
           <p:nvPr/>
         </p:nvPicPr>
         <p:blipFill rotWithShape="1">
-          <a:blip r:embed="rId3">
-            <a:extLst>
-              <a:ext uri="{28A0092B-C50C-407E-A947-70E740481C1C}">
-                <a14:useLocalDpi xmlns:a14="http://schemas.microsoft.com/office/drawing/2010/main" val="0"/>
-              </a:ext>
-            </a:extLst>
-          </a:blip>
-          <a:srcRect l="24348" t="3285" r="25032" b="90290"/>
+          <a:blip r:embed="rId2"/>
+          <a:srcRect l="3550" t="11229" r="2104" b="6840"/>
           <a:stretch/>
         </p:blipFill>
-        <p:spPr bwMode="auto">
-          <a:xfrm>
-            <a:off x="0" y="1304925"/>
-            <a:ext cx="4526905" cy="352480"/>
+        <p:spPr>
+          <a:xfrm>
+            <a:off x="652841" y="848533"/>
+            <a:ext cx="10432455" cy="5160934"/>
           </a:xfrm>
           <a:prstGeom prst="rect">
             <a:avLst/>
           </a:prstGeom>
-          <a:noFill/>
-          <a:extLst>
-            <a:ext uri="{909E8E84-426E-40DD-AFC4-6F175D3DCCD1}">
-              <a14:hiddenFill xmlns:a14="http://schemas.microsoft.com/office/drawing/2010/main">
-                <a:solidFill>
-                  <a:srgbClr val="FFFFFF"/>
-                </a:solidFill>
-              </a14:hiddenFill>
-            </a:ext>
-          </a:extLst>
-        </p:spPr>
-      </p:pic>
-      <p:pic>
-        <p:nvPicPr>
-          <p:cNvPr id="7" name="Picture 2">
-            <a:extLst>
-              <a:ext uri="{FF2B5EF4-FFF2-40B4-BE49-F238E27FC236}">
-                <a16:creationId xmlns:a16="http://schemas.microsoft.com/office/drawing/2014/main" id="{4A625E15-D4E3-5447-0FED-43278B987AC9}"/>
-              </a:ext>
-            </a:extLst>
-          </p:cNvPr>
-          <p:cNvPicPr>
-            <a:picLocks noChangeAspect="1" noChangeArrowheads="1"/>
-          </p:cNvPicPr>
-          <p:nvPr/>
-        </p:nvPicPr>
-        <p:blipFill rotWithShape="1">
-          <a:blip r:embed="rId3">
-            <a:extLst>
-              <a:ext uri="{28A0092B-C50C-407E-A947-70E740481C1C}">
-                <a14:useLocalDpi xmlns:a14="http://schemas.microsoft.com/office/drawing/2010/main" val="0"/>
-              </a:ext>
-            </a:extLst>
-          </a:blip>
-          <a:srcRect l="68659" t="9781" r="2171" b="4558"/>
-          <a:stretch/>
-        </p:blipFill>
-        <p:spPr bwMode="auto">
-          <a:xfrm>
-            <a:off x="2263452" y="1657405"/>
-            <a:ext cx="2608699" cy="4698944"/>
-          </a:xfrm>
-          <a:prstGeom prst="rect">
-            <a:avLst/>
-          </a:prstGeom>
-          <a:noFill/>
-          <a:extLst>
-            <a:ext uri="{909E8E84-426E-40DD-AFC4-6F175D3DCCD1}">
-              <a14:hiddenFill xmlns:a14="http://schemas.microsoft.com/office/drawing/2010/main">
-                <a:solidFill>
-                  <a:srgbClr val="FFFFFF"/>
-                </a:solidFill>
-              </a14:hiddenFill>
-            </a:ext>
-          </a:extLst>
-        </p:spPr>
-      </p:pic>
-      <p:pic>
-        <p:nvPicPr>
-          <p:cNvPr id="9" name="Picture 2">
-            <a:extLst>
-              <a:ext uri="{FF2B5EF4-FFF2-40B4-BE49-F238E27FC236}">
-                <a16:creationId xmlns:a16="http://schemas.microsoft.com/office/drawing/2014/main" id="{F6A76241-E4BA-E073-FF8D-5CD93EC28651}"/>
-              </a:ext>
-            </a:extLst>
-          </p:cNvPr>
-          <p:cNvPicPr>
-            <a:picLocks noChangeAspect="1" noChangeArrowheads="1"/>
-          </p:cNvPicPr>
-          <p:nvPr/>
-        </p:nvPicPr>
-        <p:blipFill rotWithShape="1">
-          <a:blip r:embed="rId3">
-            <a:extLst>
-              <a:ext uri="{28A0092B-C50C-407E-A947-70E740481C1C}">
-                <a14:useLocalDpi xmlns:a14="http://schemas.microsoft.com/office/drawing/2010/main" val="0"/>
-              </a:ext>
-            </a:extLst>
-          </a:blip>
-          <a:srcRect l="2285" t="9781" r="73453" b="4558"/>
-          <a:stretch/>
-        </p:blipFill>
-        <p:spPr bwMode="auto">
-          <a:xfrm>
-            <a:off x="0" y="1657405"/>
-            <a:ext cx="2169763" cy="4698944"/>
-          </a:xfrm>
-          <a:prstGeom prst="rect">
-            <a:avLst/>
-          </a:prstGeom>
-          <a:noFill/>
-          <a:extLst>
-            <a:ext uri="{909E8E84-426E-40DD-AFC4-6F175D3DCCD1}">
-              <a14:hiddenFill xmlns:a14="http://schemas.microsoft.com/office/drawing/2010/main">
-                <a:solidFill>
-                  <a:srgbClr val="FFFFFF"/>
-                </a:solidFill>
-              </a14:hiddenFill>
-            </a:ext>
-          </a:extLst>
-        </p:spPr>
-      </p:pic>
-      <p:pic>
-        <p:nvPicPr>
-          <p:cNvPr id="3078" name="Picture 6" descr="NodeMCU ESP8266 Pinout Listing To Matching Functions">
-            <a:extLst>
-              <a:ext uri="{FF2B5EF4-FFF2-40B4-BE49-F238E27FC236}">
-                <a16:creationId xmlns:a16="http://schemas.microsoft.com/office/drawing/2014/main" id="{5551313F-6098-9F29-8EB8-CC9ED80B0DED}"/>
-              </a:ext>
-            </a:extLst>
-          </p:cNvPr>
-          <p:cNvPicPr>
-            <a:picLocks noChangeAspect="1" noChangeArrowheads="1"/>
-          </p:cNvPicPr>
-          <p:nvPr/>
-        </p:nvPicPr>
-        <p:blipFill>
-          <a:blip r:embed="rId4">
-            <a:extLst>
-              <a:ext uri="{28A0092B-C50C-407E-A947-70E740481C1C}">
-                <a14:useLocalDpi xmlns:a14="http://schemas.microsoft.com/office/drawing/2010/main" val="0"/>
-              </a:ext>
-            </a:extLst>
-          </a:blip>
-          <a:srcRect/>
-          <a:stretch>
-            <a:fillRect/>
-          </a:stretch>
-        </p:blipFill>
-        <p:spPr bwMode="auto">
-          <a:xfrm>
-            <a:off x="4526905" y="291992"/>
-            <a:ext cx="7620000" cy="6246919"/>
-          </a:xfrm>
-          <a:prstGeom prst="rect">
-            <a:avLst/>
-          </a:prstGeom>
-          <a:noFill/>
-          <a:extLst>
-            <a:ext uri="{909E8E84-426E-40DD-AFC4-6F175D3DCCD1}">
-              <a14:hiddenFill xmlns:a14="http://schemas.microsoft.com/office/drawing/2010/main">
-                <a:solidFill>
-                  <a:srgbClr val="FFFFFF"/>
-                </a:solidFill>
-              </a14:hiddenFill>
-            </a:ext>
-          </a:extLst>
         </p:spPr>
       </p:pic>
     </p:spTree>
     <p:extLst>
       <p:ext uri="{BB962C8B-B14F-4D97-AF65-F5344CB8AC3E}">
-        <p14:creationId xmlns:p14="http://schemas.microsoft.com/office/powerpoint/2010/main" val="690536802"/>
+        <p14:creationId xmlns:p14="http://schemas.microsoft.com/office/powerpoint/2010/main" val="6368643"/>
       </p:ext>
     </p:extLst>
   </p:cSld>
@@ -7121,10 +7334,87 @@
       </p:grpSpPr>
       <p:sp>
         <p:nvSpPr>
+          <p:cNvPr id="2" name="Title 1">
+            <a:extLst>
+              <a:ext uri="{FF2B5EF4-FFF2-40B4-BE49-F238E27FC236}">
+                <a16:creationId xmlns:a16="http://schemas.microsoft.com/office/drawing/2014/main" id="{D4653BF4-6449-520D-18C3-18593EF119BE}"/>
+              </a:ext>
+            </a:extLst>
+          </p:cNvPr>
+          <p:cNvSpPr>
+            <a:spLocks noGrp="1"/>
+          </p:cNvSpPr>
+          <p:nvPr>
+            <p:ph type="title"/>
+          </p:nvPr>
+        </p:nvSpPr>
+        <p:spPr/>
+        <p:txBody>
+          <a:bodyPr/>
+          <a:lstStyle/>
+          <a:p>
+            <a:r>
+              <a:rPr lang="en-US" dirty="0" err="1"/>
+              <a:t>Frimeware</a:t>
+            </a:r>
+            <a:endParaRPr lang="en-US" dirty="0"/>
+          </a:p>
+        </p:txBody>
+      </p:sp>
+      <p:sp>
+        <p:nvSpPr>
+          <p:cNvPr id="3" name="Content Placeholder 2">
+            <a:extLst>
+              <a:ext uri="{FF2B5EF4-FFF2-40B4-BE49-F238E27FC236}">
+                <a16:creationId xmlns:a16="http://schemas.microsoft.com/office/drawing/2014/main" id="{466D6436-02AC-50C9-7DE1-8F4A63335DFA}"/>
+              </a:ext>
+            </a:extLst>
+          </p:cNvPr>
+          <p:cNvSpPr>
+            <a:spLocks noGrp="1"/>
+          </p:cNvSpPr>
+          <p:nvPr>
+            <p:ph sz="half" idx="2"/>
+          </p:nvPr>
+        </p:nvSpPr>
+        <p:spPr>
+          <a:xfrm>
+            <a:off x="468923" y="2763078"/>
+            <a:ext cx="9636369" cy="3407051"/>
+          </a:xfrm>
+        </p:spPr>
+        <p:txBody>
+          <a:bodyPr>
+            <a:normAutofit/>
+          </a:bodyPr>
+          <a:lstStyle/>
+          <a:p>
+            <a:r>
+              <a:rPr lang="en-US" sz="3200" dirty="0"/>
+              <a:t>Stable firmware builds</a:t>
+            </a:r>
+          </a:p>
+          <a:p>
+            <a:r>
+              <a:rPr lang="en-US" sz="3200" b="0" i="0" dirty="0">
+                <a:solidFill>
+                  <a:srgbClr val="404040"/>
+                </a:solidFill>
+                <a:effectLst/>
+                <a:latin typeface="Lato" panose="020F0502020204030203" pitchFamily="34" charset="0"/>
+              </a:rPr>
+              <a:t>The minimum requirement for flash size is 1Mbyte</a:t>
+            </a:r>
+            <a:endParaRPr lang="en-US" sz="3200" dirty="0"/>
+          </a:p>
+        </p:txBody>
+      </p:sp>
+      <p:sp>
+        <p:nvSpPr>
           <p:cNvPr id="4" name="Slide Number Placeholder 3">
             <a:extLst>
               <a:ext uri="{FF2B5EF4-FFF2-40B4-BE49-F238E27FC236}">
-                <a16:creationId xmlns:a16="http://schemas.microsoft.com/office/drawing/2014/main" id="{4304B203-F0ED-326D-632B-C3F1E4A476AF}"/>
+                <a16:creationId xmlns:a16="http://schemas.microsoft.com/office/drawing/2014/main" id="{2BC9EA47-6756-D8A0-B237-0524839999E9}"/>
               </a:ext>
             </a:extLst>
           </p:cNvPr>
@@ -7149,39 +7439,10 @@
           </a:p>
         </p:txBody>
       </p:sp>
-      <p:pic>
-        <p:nvPicPr>
-          <p:cNvPr id="6" name="Picture 5" descr="A screenshot of a computer program&#10;&#10;Description automatically generated">
-            <a:extLst>
-              <a:ext uri="{FF2B5EF4-FFF2-40B4-BE49-F238E27FC236}">
-                <a16:creationId xmlns:a16="http://schemas.microsoft.com/office/drawing/2014/main" id="{10A9AE73-EA40-50AE-B55B-69A4E765E340}"/>
-              </a:ext>
-            </a:extLst>
-          </p:cNvPr>
-          <p:cNvPicPr>
-            <a:picLocks noChangeAspect="1"/>
-          </p:cNvPicPr>
-          <p:nvPr/>
-        </p:nvPicPr>
-        <p:blipFill rotWithShape="1">
-          <a:blip r:embed="rId2"/>
-          <a:srcRect l="3550" t="11229" r="2104" b="6840"/>
-          <a:stretch/>
-        </p:blipFill>
-        <p:spPr>
-          <a:xfrm>
-            <a:off x="652841" y="848533"/>
-            <a:ext cx="10432455" cy="5160934"/>
-          </a:xfrm>
-          <a:prstGeom prst="rect">
-            <a:avLst/>
-          </a:prstGeom>
-        </p:spPr>
-      </p:pic>
     </p:spTree>
     <p:extLst>
       <p:ext uri="{BB962C8B-B14F-4D97-AF65-F5344CB8AC3E}">
-        <p14:creationId xmlns:p14="http://schemas.microsoft.com/office/powerpoint/2010/main" val="6368643"/>
+        <p14:creationId xmlns:p14="http://schemas.microsoft.com/office/powerpoint/2010/main" val="22605347"/>
       </p:ext>
     </p:extLst>
   </p:cSld>
@@ -7224,7 +7485,12 @@
             <p:ph sz="half" idx="2"/>
           </p:nvPr>
         </p:nvSpPr>
-        <p:spPr/>
+        <p:spPr>
+          <a:xfrm>
+            <a:off x="247426" y="2036247"/>
+            <a:ext cx="11113476" cy="3407051"/>
+          </a:xfrm>
+        </p:spPr>
         <p:txBody>
           <a:bodyPr>
             <a:normAutofit/>
@@ -7233,8 +7499,11 @@
           <a:p>
             <a:r>
               <a:rPr lang="en-US" sz="4800" dirty="0"/>
-              <a:t>Install driver on windows </a:t>
-            </a:r>
+              <a:t>Install driver of ESP8266 on windows </a:t>
+            </a:r>
+          </a:p>
+          <a:p>
+            <a:endParaRPr lang="en-US" sz="4800" dirty="0"/>
           </a:p>
           <a:p>
             <a:r>
@@ -7306,10 +7575,10 @@
       </p:grpSpPr>
       <p:sp>
         <p:nvSpPr>
-          <p:cNvPr id="68" name="Slide Number Placeholder 67">
-            <a:extLst>
-              <a:ext uri="{FF2B5EF4-FFF2-40B4-BE49-F238E27FC236}">
-                <a16:creationId xmlns:a16="http://schemas.microsoft.com/office/drawing/2014/main" id="{AA0ACADD-CC4E-851C-DA07-C22DB97FA23E}"/>
+          <p:cNvPr id="2" name="Title 1">
+            <a:extLst>
+              <a:ext uri="{FF2B5EF4-FFF2-40B4-BE49-F238E27FC236}">
+                <a16:creationId xmlns:a16="http://schemas.microsoft.com/office/drawing/2014/main" id="{8BDF1EDE-5423-435C-B149-87AB1BC22B83}"/>
               </a:ext>
             </a:extLst>
           </p:cNvPr>
@@ -7317,13 +7586,46 @@
             <a:spLocks noGrp="1"/>
           </p:cNvSpPr>
           <p:nvPr>
-            <p:ph type="sldNum" sz="quarter" idx="13"/>
+            <p:ph type="ctrTitle"/>
           </p:nvPr>
         </p:nvSpPr>
         <p:spPr>
           <a:xfrm>
-            <a:off x="10373350" y="6356349"/>
-            <a:ext cx="987552" cy="365125"/>
+            <a:off x="4267200" y="1615736"/>
+            <a:ext cx="4179570" cy="1524735"/>
+          </a:xfrm>
+        </p:spPr>
+        <p:txBody>
+          <a:bodyPr/>
+          <a:lstStyle/>
+          <a:p>
+            <a:r>
+              <a:rPr lang="en-US" dirty="0"/>
+              <a:t>THANK YOU</a:t>
+            </a:r>
+          </a:p>
+        </p:txBody>
+      </p:sp>
+      <p:sp>
+        <p:nvSpPr>
+          <p:cNvPr id="6" name="Slide Number Placeholder 5">
+            <a:extLst>
+              <a:ext uri="{FF2B5EF4-FFF2-40B4-BE49-F238E27FC236}">
+                <a16:creationId xmlns:a16="http://schemas.microsoft.com/office/drawing/2014/main" id="{4C127D99-645F-4FCF-9573-FDFE2A344FA9}"/>
+              </a:ext>
+            </a:extLst>
+          </p:cNvPr>
+          <p:cNvSpPr>
+            <a:spLocks noGrp="1"/>
+          </p:cNvSpPr>
+          <p:nvPr>
+            <p:ph type="sldNum" sz="quarter" idx="12"/>
+          </p:nvPr>
+        </p:nvSpPr>
+        <p:spPr>
+          <a:xfrm>
+            <a:off x="9579428" y="6356350"/>
+            <a:ext cx="1774371" cy="365125"/>
           </a:xfrm>
         </p:spPr>
         <p:txBody>
@@ -7334,503 +7636,6 @@
               <a:rPr lang="en-US" smtClean="0"/>
               <a:pPr/>
               <a:t>6</a:t>
-            </a:fld>
-            <a:endParaRPr lang="en-US" dirty="0"/>
-          </a:p>
-        </p:txBody>
-      </p:sp>
-      <p:sp>
-        <p:nvSpPr>
-          <p:cNvPr id="5" name="TextBox 4">
-            <a:extLst>
-              <a:ext uri="{FF2B5EF4-FFF2-40B4-BE49-F238E27FC236}">
-                <a16:creationId xmlns:a16="http://schemas.microsoft.com/office/drawing/2014/main" id="{EE44276D-82C5-CE31-638A-366A61332441}"/>
-              </a:ext>
-            </a:extLst>
-          </p:cNvPr>
-          <p:cNvSpPr txBox="1"/>
-          <p:nvPr/>
-        </p:nvSpPr>
-        <p:spPr>
-          <a:xfrm>
-            <a:off x="120902" y="1023583"/>
-            <a:ext cx="10926950" cy="523220"/>
-          </a:xfrm>
-          <a:prstGeom prst="rect">
-            <a:avLst/>
-          </a:prstGeom>
-          <a:noFill/>
-        </p:spPr>
-        <p:txBody>
-          <a:bodyPr wrap="square" rtlCol="0">
-            <a:spAutoFit/>
-          </a:bodyPr>
-          <a:lstStyle/>
-          <a:p>
-            <a:pPr algn="l"/>
-            <a:r>
-              <a:rPr lang="en-US" sz="2800" b="1" i="0" dirty="0">
-                <a:solidFill>
-                  <a:srgbClr val="0070C0"/>
-                </a:solidFill>
-                <a:effectLst/>
-                <a:highlight>
-                  <a:srgbClr val="FCFCFC"/>
-                </a:highlight>
-                <a:latin typeface="Roboto Slab" panose="020F0502020204030204" pitchFamily="2" charset="0"/>
-              </a:rPr>
-              <a:t>The </a:t>
-            </a:r>
-            <a:r>
-              <a:rPr lang="en-US" sz="2800" b="1" i="0" dirty="0" err="1">
-                <a:solidFill>
-                  <a:srgbClr val="0070C0"/>
-                </a:solidFill>
-                <a:effectLst/>
-                <a:highlight>
-                  <a:srgbClr val="FCFCFC"/>
-                </a:highlight>
-                <a:latin typeface="Roboto Slab" panose="020F0502020204030204" pitchFamily="2" charset="0"/>
-              </a:rPr>
-              <a:t>MicroPython</a:t>
-            </a:r>
-            <a:r>
-              <a:rPr lang="en-US" sz="2800" b="1" i="0" dirty="0">
-                <a:solidFill>
-                  <a:srgbClr val="0070C0"/>
-                </a:solidFill>
-                <a:effectLst/>
-                <a:highlight>
-                  <a:srgbClr val="FCFCFC"/>
-                </a:highlight>
-                <a:latin typeface="Roboto Slab" panose="020F0502020204030204" pitchFamily="2" charset="0"/>
-              </a:rPr>
-              <a:t> Interactive Interpreter Mode (aka REPL)</a:t>
-            </a:r>
-          </a:p>
-        </p:txBody>
-      </p:sp>
-      <p:sp>
-        <p:nvSpPr>
-          <p:cNvPr id="20" name="TextBox 19">
-            <a:extLst>
-              <a:ext uri="{FF2B5EF4-FFF2-40B4-BE49-F238E27FC236}">
-                <a16:creationId xmlns:a16="http://schemas.microsoft.com/office/drawing/2014/main" id="{2B753F7C-7294-9AE0-053A-95D00F0D9022}"/>
-              </a:ext>
-            </a:extLst>
-          </p:cNvPr>
-          <p:cNvSpPr txBox="1"/>
-          <p:nvPr/>
-        </p:nvSpPr>
-        <p:spPr>
-          <a:xfrm>
-            <a:off x="377480" y="3833870"/>
-            <a:ext cx="7960607" cy="1200329"/>
-          </a:xfrm>
-          <a:prstGeom prst="rect">
-            <a:avLst/>
-          </a:prstGeom>
-          <a:noFill/>
-        </p:spPr>
-        <p:txBody>
-          <a:bodyPr wrap="square">
-            <a:spAutoFit/>
-          </a:bodyPr>
-          <a:lstStyle/>
-          <a:p>
-            <a:r>
-              <a:rPr lang="en-US" sz="2400" b="1" i="0" dirty="0">
-                <a:solidFill>
-                  <a:srgbClr val="404040"/>
-                </a:solidFill>
-                <a:effectLst/>
-                <a:highlight>
-                  <a:srgbClr val="FCFCFC"/>
-                </a:highlight>
-                <a:latin typeface="Roboto Slab" pitchFamily="2" charset="0"/>
-              </a:rPr>
-              <a:t>1- Auto-indent</a:t>
-            </a:r>
-          </a:p>
-          <a:p>
-            <a:r>
-              <a:rPr lang="en-US" sz="2400" b="1" i="0" dirty="0">
-                <a:solidFill>
-                  <a:srgbClr val="404040"/>
-                </a:solidFill>
-                <a:effectLst/>
-                <a:highlight>
-                  <a:srgbClr val="FCFCFC"/>
-                </a:highlight>
-                <a:latin typeface="Roboto Slab" pitchFamily="2" charset="0"/>
-              </a:rPr>
-              <a:t>2- Auto-completion</a:t>
-            </a:r>
-          </a:p>
-          <a:p>
-            <a:r>
-              <a:rPr lang="en-US" sz="2400" b="1" i="0" dirty="0">
-                <a:solidFill>
-                  <a:srgbClr val="404040"/>
-                </a:solidFill>
-                <a:effectLst/>
-                <a:highlight>
-                  <a:srgbClr val="FCFCFC"/>
-                </a:highlight>
-                <a:latin typeface="Roboto Slab" pitchFamily="2" charset="0"/>
-              </a:rPr>
-              <a:t>3- Interrupting a running program</a:t>
-            </a:r>
-          </a:p>
-        </p:txBody>
-      </p:sp>
-      <p:sp>
-        <p:nvSpPr>
-          <p:cNvPr id="23" name="TextBox 22">
-            <a:extLst>
-              <a:ext uri="{FF2B5EF4-FFF2-40B4-BE49-F238E27FC236}">
-                <a16:creationId xmlns:a16="http://schemas.microsoft.com/office/drawing/2014/main" id="{F6B0E663-8553-7555-F64D-F7CD4D5F9CF1}"/>
-              </a:ext>
-            </a:extLst>
-          </p:cNvPr>
-          <p:cNvSpPr txBox="1"/>
-          <p:nvPr/>
-        </p:nvSpPr>
-        <p:spPr>
-          <a:xfrm>
-            <a:off x="237995" y="1454470"/>
-            <a:ext cx="11574049" cy="2215991"/>
-          </a:xfrm>
-          <a:prstGeom prst="rect">
-            <a:avLst/>
-          </a:prstGeom>
-          <a:noFill/>
-        </p:spPr>
-        <p:txBody>
-          <a:bodyPr wrap="square" rtlCol="0">
-            <a:spAutoFit/>
-          </a:bodyPr>
-          <a:lstStyle/>
-          <a:p>
-            <a:endParaRPr lang="en-US" b="0" i="0" dirty="0">
-              <a:solidFill>
-                <a:srgbClr val="404040"/>
-              </a:solidFill>
-              <a:effectLst/>
-              <a:highlight>
-                <a:srgbClr val="FCFCFC"/>
-              </a:highlight>
-              <a:latin typeface="Lato" panose="020F0502020204030203" pitchFamily="34" charset="0"/>
-            </a:endParaRPr>
-          </a:p>
-          <a:p>
-            <a:r>
-              <a:rPr lang="en-US" sz="2400" b="0" i="0" dirty="0">
-                <a:solidFill>
-                  <a:srgbClr val="404040"/>
-                </a:solidFill>
-                <a:effectLst/>
-                <a:highlight>
-                  <a:srgbClr val="FCFCFC"/>
-                </a:highlight>
-                <a:latin typeface="Lato" panose="020F0502020204030203" pitchFamily="34" charset="0"/>
-              </a:rPr>
-              <a:t>An acronym for “Read, Eval, Print, Loop”. </a:t>
-            </a:r>
-          </a:p>
-          <a:p>
-            <a:endParaRPr lang="en-US" sz="2400" dirty="0">
-              <a:solidFill>
-                <a:srgbClr val="404040"/>
-              </a:solidFill>
-              <a:highlight>
-                <a:srgbClr val="FCFCFC"/>
-              </a:highlight>
-              <a:latin typeface="Lato" panose="020F0502020204030203" pitchFamily="34" charset="0"/>
-            </a:endParaRPr>
-          </a:p>
-          <a:p>
-            <a:r>
-              <a:rPr lang="en-US" sz="2400" b="0" i="0" dirty="0">
-                <a:solidFill>
-                  <a:srgbClr val="404040"/>
-                </a:solidFill>
-                <a:effectLst/>
-                <a:highlight>
-                  <a:srgbClr val="FCFCFC"/>
-                </a:highlight>
-                <a:latin typeface="Lato" panose="020F0502020204030203" pitchFamily="34" charset="0"/>
-              </a:rPr>
-              <a:t>This is the interactive Python prompt, useful for debugging or testing code. </a:t>
-            </a:r>
-          </a:p>
-          <a:p>
-            <a:endParaRPr lang="en-US" sz="2400" dirty="0">
-              <a:solidFill>
-                <a:srgbClr val="404040"/>
-              </a:solidFill>
-              <a:highlight>
-                <a:srgbClr val="FCFCFC"/>
-              </a:highlight>
-              <a:latin typeface="Lato" panose="020F0502020204030203" pitchFamily="34" charset="0"/>
-            </a:endParaRPr>
-          </a:p>
-          <a:p>
-            <a:r>
-              <a:rPr lang="en-US" sz="2400" b="0" i="0" dirty="0">
-                <a:solidFill>
-                  <a:srgbClr val="404040"/>
-                </a:solidFill>
-                <a:effectLst/>
-                <a:highlight>
-                  <a:srgbClr val="FCFCFC"/>
-                </a:highlight>
-                <a:latin typeface="Lato" panose="020F0502020204030203" pitchFamily="34" charset="0"/>
-              </a:rPr>
-              <a:t>a REPL available over a UART, and this is typically accessible on a host PC via USB.</a:t>
-            </a:r>
-            <a:endParaRPr lang="en-US" sz="2400" dirty="0"/>
-          </a:p>
-        </p:txBody>
-      </p:sp>
-    </p:spTree>
-    <p:extLst>
-      <p:ext uri="{BB962C8B-B14F-4D97-AF65-F5344CB8AC3E}">
-        <p14:creationId xmlns:p14="http://schemas.microsoft.com/office/powerpoint/2010/main" val="636929804"/>
-      </p:ext>
-    </p:extLst>
-  </p:cSld>
-  <p:clrMapOvr>
-    <a:masterClrMapping/>
-  </p:clrMapOvr>
-</p:sld>
-</file>
-
-<file path=ppt/slides/slide7.xml><?xml version="1.0" encoding="utf-8"?>
-<p:sld xmlns:a="http://schemas.openxmlformats.org/drawingml/2006/main" xmlns:r="http://schemas.openxmlformats.org/officeDocument/2006/relationships" xmlns:p="http://schemas.openxmlformats.org/presentationml/2006/main">
-  <p:cSld>
-    <p:spTree>
-      <p:nvGrpSpPr>
-        <p:cNvPr id="1" name=""/>
-        <p:cNvGrpSpPr/>
-        <p:nvPr/>
-      </p:nvGrpSpPr>
-      <p:grpSpPr>
-        <a:xfrm>
-          <a:off x="0" y="0"/>
-          <a:ext cx="0" cy="0"/>
-          <a:chOff x="0" y="0"/>
-          <a:chExt cx="0" cy="0"/>
-        </a:xfrm>
-      </p:grpSpPr>
-      <p:sp>
-        <p:nvSpPr>
-          <p:cNvPr id="2" name="Title 1">
-            <a:extLst>
-              <a:ext uri="{FF2B5EF4-FFF2-40B4-BE49-F238E27FC236}">
-                <a16:creationId xmlns:a16="http://schemas.microsoft.com/office/drawing/2014/main" id="{BE6A340F-4393-03F2-6165-B4592311A822}"/>
-              </a:ext>
-            </a:extLst>
-          </p:cNvPr>
-          <p:cNvSpPr>
-            <a:spLocks noGrp="1"/>
-          </p:cNvSpPr>
-          <p:nvPr>
-            <p:ph type="title"/>
-          </p:nvPr>
-        </p:nvSpPr>
-        <p:spPr>
-          <a:xfrm>
-            <a:off x="256238" y="619931"/>
-            <a:ext cx="9953308" cy="805329"/>
-          </a:xfrm>
-        </p:spPr>
-        <p:txBody>
-          <a:bodyPr/>
-          <a:lstStyle/>
-          <a:p>
-            <a:r>
-              <a:rPr lang="en-US" b="1" i="0" dirty="0" err="1">
-                <a:solidFill>
-                  <a:srgbClr val="404040"/>
-                </a:solidFill>
-                <a:effectLst/>
-                <a:highlight>
-                  <a:srgbClr val="FCFCFC"/>
-                </a:highlight>
-                <a:latin typeface="Roboto Slab" pitchFamily="2" charset="0"/>
-              </a:rPr>
-              <a:t>MicroPython</a:t>
-            </a:r>
-            <a:r>
-              <a:rPr lang="en-US" b="1" i="0" dirty="0">
-                <a:solidFill>
-                  <a:srgbClr val="404040"/>
-                </a:solidFill>
-                <a:effectLst/>
-                <a:highlight>
-                  <a:srgbClr val="FCFCFC"/>
-                </a:highlight>
-                <a:latin typeface="Roboto Slab" pitchFamily="2" charset="0"/>
-              </a:rPr>
-              <a:t> libraries</a:t>
-            </a:r>
-            <a:endParaRPr lang="en-US" dirty="0"/>
-          </a:p>
-        </p:txBody>
-      </p:sp>
-      <p:sp>
-        <p:nvSpPr>
-          <p:cNvPr id="7" name="Slide Number Placeholder 6">
-            <a:extLst>
-              <a:ext uri="{FF2B5EF4-FFF2-40B4-BE49-F238E27FC236}">
-                <a16:creationId xmlns:a16="http://schemas.microsoft.com/office/drawing/2014/main" id="{80987F70-4691-A729-4ACE-4BA55F0ACD16}"/>
-              </a:ext>
-            </a:extLst>
-          </p:cNvPr>
-          <p:cNvSpPr>
-            <a:spLocks noGrp="1"/>
-          </p:cNvSpPr>
-          <p:nvPr>
-            <p:ph type="sldNum" sz="quarter" idx="13"/>
-          </p:nvPr>
-        </p:nvSpPr>
-        <p:spPr/>
-        <p:txBody>
-          <a:bodyPr/>
-          <a:lstStyle/>
-          <a:p>
-            <a:fld id="{A49DFD55-3C28-40EF-9E31-A92D2E4017FF}" type="slidenum">
-              <a:rPr lang="en-US" smtClean="0"/>
-              <a:pPr/>
-              <a:t>7</a:t>
-            </a:fld>
-            <a:endParaRPr lang="en-US" dirty="0"/>
-          </a:p>
-        </p:txBody>
-      </p:sp>
-      <p:pic>
-        <p:nvPicPr>
-          <p:cNvPr id="9" name="Picture 8">
-            <a:extLst>
-              <a:ext uri="{FF2B5EF4-FFF2-40B4-BE49-F238E27FC236}">
-                <a16:creationId xmlns:a16="http://schemas.microsoft.com/office/drawing/2014/main" id="{7BF883BB-BEDE-B692-DCBB-3C9FFD5295E1}"/>
-              </a:ext>
-            </a:extLst>
-          </p:cNvPr>
-          <p:cNvPicPr>
-            <a:picLocks noChangeAspect="1"/>
-          </p:cNvPicPr>
-          <p:nvPr/>
-        </p:nvPicPr>
-        <p:blipFill rotWithShape="1">
-          <a:blip r:embed="rId2"/>
-          <a:srcRect t="40900" r="40889" b="9020"/>
-          <a:stretch/>
-        </p:blipFill>
-        <p:spPr>
-          <a:xfrm>
-            <a:off x="666427" y="1607224"/>
-            <a:ext cx="10306373" cy="4909382"/>
-          </a:xfrm>
-          <a:prstGeom prst="rect">
-            <a:avLst/>
-          </a:prstGeom>
-        </p:spPr>
-      </p:pic>
-    </p:spTree>
-    <p:extLst>
-      <p:ext uri="{BB962C8B-B14F-4D97-AF65-F5344CB8AC3E}">
-        <p14:creationId xmlns:p14="http://schemas.microsoft.com/office/powerpoint/2010/main" val="2883028532"/>
-      </p:ext>
-    </p:extLst>
-  </p:cSld>
-  <p:clrMapOvr>
-    <a:masterClrMapping/>
-  </p:clrMapOvr>
-</p:sld>
-</file>
-
-<file path=ppt/slides/slide8.xml><?xml version="1.0" encoding="utf-8"?>
-<p:sld xmlns:a="http://schemas.openxmlformats.org/drawingml/2006/main" xmlns:r="http://schemas.openxmlformats.org/officeDocument/2006/relationships" xmlns:p="http://schemas.openxmlformats.org/presentationml/2006/main">
-  <p:cSld>
-    <p:spTree>
-      <p:nvGrpSpPr>
-        <p:cNvPr id="1" name=""/>
-        <p:cNvGrpSpPr/>
-        <p:nvPr/>
-      </p:nvGrpSpPr>
-      <p:grpSpPr>
-        <a:xfrm>
-          <a:off x="0" y="0"/>
-          <a:ext cx="0" cy="0"/>
-          <a:chOff x="0" y="0"/>
-          <a:chExt cx="0" cy="0"/>
-        </a:xfrm>
-      </p:grpSpPr>
-      <p:sp>
-        <p:nvSpPr>
-          <p:cNvPr id="2" name="Title 1">
-            <a:extLst>
-              <a:ext uri="{FF2B5EF4-FFF2-40B4-BE49-F238E27FC236}">
-                <a16:creationId xmlns:a16="http://schemas.microsoft.com/office/drawing/2014/main" id="{8BDF1EDE-5423-435C-B149-87AB1BC22B83}"/>
-              </a:ext>
-            </a:extLst>
-          </p:cNvPr>
-          <p:cNvSpPr>
-            <a:spLocks noGrp="1"/>
-          </p:cNvSpPr>
-          <p:nvPr>
-            <p:ph type="ctrTitle"/>
-          </p:nvPr>
-        </p:nvSpPr>
-        <p:spPr>
-          <a:xfrm>
-            <a:off x="4267200" y="1615736"/>
-            <a:ext cx="4179570" cy="1524735"/>
-          </a:xfrm>
-        </p:spPr>
-        <p:txBody>
-          <a:bodyPr/>
-          <a:lstStyle/>
-          <a:p>
-            <a:r>
-              <a:rPr lang="en-US" dirty="0"/>
-              <a:t>THANK YOU</a:t>
-            </a:r>
-          </a:p>
-        </p:txBody>
-      </p:sp>
-      <p:sp>
-        <p:nvSpPr>
-          <p:cNvPr id="6" name="Slide Number Placeholder 5">
-            <a:extLst>
-              <a:ext uri="{FF2B5EF4-FFF2-40B4-BE49-F238E27FC236}">
-                <a16:creationId xmlns:a16="http://schemas.microsoft.com/office/drawing/2014/main" id="{4C127D99-645F-4FCF-9573-FDFE2A344FA9}"/>
-              </a:ext>
-            </a:extLst>
-          </p:cNvPr>
-          <p:cNvSpPr>
-            <a:spLocks noGrp="1"/>
-          </p:cNvSpPr>
-          <p:nvPr>
-            <p:ph type="sldNum" sz="quarter" idx="12"/>
-          </p:nvPr>
-        </p:nvSpPr>
-        <p:spPr>
-          <a:xfrm>
-            <a:off x="9579428" y="6356350"/>
-            <a:ext cx="1774371" cy="365125"/>
-          </a:xfrm>
-        </p:spPr>
-        <p:txBody>
-          <a:bodyPr/>
-          <a:lstStyle/>
-          <a:p>
-            <a:fld id="{A49DFD55-3C28-40EF-9E31-A92D2E4017FF}" type="slidenum">
-              <a:rPr lang="en-US" smtClean="0"/>
-              <a:pPr/>
-              <a:t>8</a:t>
             </a:fld>
             <a:endParaRPr lang="en-US" dirty="0"/>
           </a:p>

</xml_diff>